<commit_message>
week 17 ppt update
</commit_message>
<xml_diff>
--- a/course_material/week_17/week_17_presentation.pptx
+++ b/course_material/week_17/week_17_presentation.pptx
@@ -4627,7 +4627,7 @@
           <a:p>
             <a:fld id="{5CF9EFDB-215C-4120-ADCB-EAD745B7163E}" type="datetimeFigureOut">
               <a:rPr lang="en-US" smtClean="0"/>
-              <a:t>6/16/2021</a:t>
+              <a:t>6/20/2021</a:t>
             </a:fld>
             <a:endParaRPr lang="en-US"/>
           </a:p>
@@ -5948,7 +5948,7 @@
           <a:p>
             <a:fld id="{ACF1A1B0-862D-4909-A7DB-D8ADA062DFCA}" type="datetimeFigureOut">
               <a:rPr lang="en-US" dirty="0"/>
-              <a:t>6/16/2021</a:t>
+              <a:t>6/20/2021</a:t>
             </a:fld>
             <a:endParaRPr lang="en-US"/>
           </a:p>
@@ -6171,7 +6171,7 @@
           <a:p>
             <a:fld id="{7B156144-9CB7-4E3A-B87E-A382F9BE05EF}" type="datetimeFigureOut">
               <a:rPr lang="en-US" dirty="0"/>
-              <a:t>6/16/2021</a:t>
+              <a:t>6/20/2021</a:t>
             </a:fld>
             <a:endParaRPr lang="en-US"/>
           </a:p>
@@ -6349,7 +6349,7 @@
           <a:p>
             <a:fld id="{2643D55F-46AB-4791-9172-4FA8DD3A6A9C}" type="datetimeFigureOut">
               <a:rPr lang="en-US" dirty="0"/>
-              <a:t>6/16/2021</a:t>
+              <a:t>6/20/2021</a:t>
             </a:fld>
             <a:endParaRPr lang="en-US"/>
           </a:p>
@@ -6517,7 +6517,7 @@
           <a:p>
             <a:fld id="{58026881-8A08-449C-8D73-E5F201F814C1}" type="datetimeFigureOut">
               <a:rPr lang="en-US" dirty="0"/>
-              <a:t>6/16/2021</a:t>
+              <a:t>6/20/2021</a:t>
             </a:fld>
             <a:endParaRPr lang="en-US"/>
           </a:p>
@@ -6807,7 +6807,7 @@
           <a:p>
             <a:fld id="{1BEB5A5E-0C07-4E93-A112-D37B4D166B30}" type="datetimeFigureOut">
               <a:rPr lang="en-US" dirty="0"/>
-              <a:t>6/16/2021</a:t>
+              <a:t>6/20/2021</a:t>
             </a:fld>
             <a:endParaRPr lang="en-US"/>
           </a:p>
@@ -7130,7 +7130,7 @@
           <a:p>
             <a:fld id="{9E1F71C5-DC57-4358-A1EA-30C08AF6E3C5}" type="datetimeFigureOut">
               <a:rPr lang="en-US" dirty="0"/>
-              <a:t>6/16/2021</a:t>
+              <a:t>6/20/2021</a:t>
             </a:fld>
             <a:endParaRPr lang="en-US"/>
           </a:p>
@@ -7539,7 +7539,7 @@
           <a:p>
             <a:fld id="{12571DBA-DE60-4731-B773-47AAA185C143}" type="datetimeFigureOut">
               <a:rPr lang="en-US" dirty="0"/>
-              <a:t>6/16/2021</a:t>
+              <a:t>6/20/2021</a:t>
             </a:fld>
             <a:endParaRPr lang="en-US"/>
           </a:p>
@@ -7656,7 +7656,7 @@
           <a:p>
             <a:fld id="{4F170639-886C-4FCF-9EAB-ABB5DA3F3F4A}" type="datetimeFigureOut">
               <a:rPr lang="en-US" dirty="0"/>
-              <a:t>6/16/2021</a:t>
+              <a:t>6/20/2021</a:t>
             </a:fld>
             <a:endParaRPr lang="en-US"/>
           </a:p>
@@ -7751,7 +7751,7 @@
           <a:p>
             <a:fld id="{34C4A628-C83B-4C66-83F4-1711CE3738FD}" type="datetimeFigureOut">
               <a:rPr lang="en-US" dirty="0"/>
-              <a:t>6/16/2021</a:t>
+              <a:t>6/20/2021</a:t>
             </a:fld>
             <a:endParaRPr lang="en-US"/>
           </a:p>
@@ -8036,7 +8036,7 @@
           <a:p>
             <a:fld id="{B88C1D73-9400-43CA-A37F-F9B7D00DE14C}" type="datetimeFigureOut">
               <a:rPr lang="en-US" dirty="0"/>
-              <a:t>6/16/2021</a:t>
+              <a:t>6/20/2021</a:t>
             </a:fld>
             <a:endParaRPr lang="en-US"/>
           </a:p>
@@ -8308,7 +8308,7 @@
           <a:p>
             <a:fld id="{188B7711-B905-4633-B4D7-6F3A49A2E7D9}" type="datetimeFigureOut">
               <a:rPr lang="en-US" dirty="0"/>
-              <a:t>6/16/2021</a:t>
+              <a:t>6/20/2021</a:t>
             </a:fld>
             <a:endParaRPr lang="en-US"/>
           </a:p>
@@ -8558,7 +8558,7 @@
             <a:fld id="{89C235CF-BDA2-4E7E-8BBD-350479985E74}" type="datetimeFigureOut">
               <a:rPr lang="en-US" dirty="0"/>
               <a:pPr/>
-              <a:t>6/16/2021</a:t>
+              <a:t>6/20/2021</a:t>
             </a:fld>
             <a:endParaRPr lang="en-US"/>
           </a:p>
@@ -10356,6 +10356,29 @@
               <a:rPr lang="en-US" dirty="0"/>
               <a:t>What are underfitting and overfitting? How do you avoid them?</a:t>
             </a:r>
+          </a:p>
+          <a:p>
+            <a:endParaRPr lang="en-US" dirty="0"/>
+          </a:p>
+          <a:p>
+            <a:endParaRPr lang="en-US" dirty="0"/>
+          </a:p>
+          <a:p>
+            <a:endParaRPr lang="en-US" dirty="0"/>
+          </a:p>
+          <a:p>
+            <a:endParaRPr lang="en-US" dirty="0"/>
+          </a:p>
+          <a:p>
+            <a:r>
+              <a:rPr lang="en-US" dirty="0"/>
+              <a:t>What is cross </a:t>
+            </a:r>
+            <a:r>
+              <a:rPr lang="en-US"/>
+              <a:t>validation?</a:t>
+            </a:r>
+            <a:endParaRPr lang="en-US" dirty="0"/>
           </a:p>
           <a:p>
             <a:endParaRPr lang="en-US" dirty="0"/>

</xml_diff>